<commit_message>
Update PicMe Project Presentation.pptx
</commit_message>
<xml_diff>
--- a/PicMe Project Presentation.pptx
+++ b/PicMe Project Presentation.pptx
@@ -16,16 +16,22 @@
     <p:sldId id="261" r:id="rId11"/>
     <p:sldId id="262" r:id="rId12"/>
     <p:sldId id="263" r:id="rId13"/>
+    <p:sldId id="264" r:id="rId14"/>
   </p:sldIdLst>
   <p:sldSz cy="5143500" cx="9144000"/>
   <p:notesSz cx="6858000" cy="9144000"/>
   <p:embeddedFontLst>
     <p:embeddedFont>
       <p:font typeface="Roboto"/>
-      <p:regular r:id="rId14"/>
-      <p:bold r:id="rId15"/>
-      <p:italic r:id="rId16"/>
-      <p:boldItalic r:id="rId17"/>
+      <p:regular r:id="rId15"/>
+      <p:bold r:id="rId16"/>
+      <p:italic r:id="rId17"/>
+      <p:boldItalic r:id="rId18"/>
+    </p:embeddedFont>
+    <p:embeddedFont>
+      <p:font typeface="Lexend"/>
+      <p:regular r:id="rId19"/>
+      <p:bold r:id="rId20"/>
     </p:embeddedFont>
   </p:embeddedFontLst>
   <p:defaultTextStyle>
@@ -892,6 +898,22 @@
             </a:r>
             <a:endParaRPr/>
           </a:p>
+          <a:p>
+            <a:pPr indent="0" lvl="0" marL="0" rtl="0" algn="l">
+              <a:spcBef>
+                <a:spcPts val="0"/>
+              </a:spcBef>
+              <a:spcAft>
+                <a:spcPts val="0"/>
+              </a:spcAft>
+              <a:buNone/>
+            </a:pPr>
+            <a:r>
+              <a:rPr lang="en"/>
+              <a:t>We each talk about ourselves.</a:t>
+            </a:r>
+            <a:endParaRPr/>
+          </a:p>
         </p:txBody>
       </p:sp>
     </p:spTree>
@@ -1005,6 +1027,21 @@
             <a:r>
               <a:rPr lang="en"/>
               <a:t> were more significant.</a:t>
+            </a:r>
+            <a:endParaRPr/>
+          </a:p>
+          <a:p>
+            <a:pPr indent="0" lvl="0" marL="0" rtl="0" algn="l">
+              <a:spcBef>
+                <a:spcPts val="0"/>
+              </a:spcBef>
+              <a:spcAft>
+                <a:spcPts val="0"/>
+              </a:spcAft>
+              <a:buNone/>
+            </a:pPr>
+            <a:r>
+              <a:t/>
             </a:r>
             <a:endParaRPr/>
           </a:p>
@@ -1239,7 +1276,7 @@
   <p:cSld>
     <p:spTree>
       <p:nvGrpSpPr>
-        <p:cNvPr id="101" name="Shape 101"/>
+        <p:cNvPr id="100" name="Shape 100"/>
         <p:cNvGrpSpPr/>
         <p:nvPr/>
       </p:nvGrpSpPr>
@@ -1253,7 +1290,7 @@
       </p:grpSpPr>
       <p:sp>
         <p:nvSpPr>
-          <p:cNvPr id="102" name="Google Shape;102;g226beb88262_0_103:notes"/>
+          <p:cNvPr id="101" name="Google Shape;101;g226beb88262_0_103:notes"/>
           <p:cNvSpPr/>
           <p:nvPr>
             <p:ph idx="2" type="sldImg"/>
@@ -1288,7 +1325,7 @@
       </p:sp>
       <p:sp>
         <p:nvSpPr>
-          <p:cNvPr id="103" name="Google Shape;103;g226beb88262_0_103:notes"/>
+          <p:cNvPr id="102" name="Google Shape;102;g226beb88262_0_103:notes"/>
           <p:cNvSpPr txBox="1"/>
           <p:nvPr>
             <p:ph idx="1" type="body"/>
@@ -1339,7 +1376,7 @@
   <p:cSld>
     <p:spTree>
       <p:nvGrpSpPr>
-        <p:cNvPr id="106" name="Shape 106"/>
+        <p:cNvPr id="105" name="Shape 105"/>
         <p:cNvGrpSpPr/>
         <p:nvPr/>
       </p:nvGrpSpPr>
@@ -1353,7 +1390,7 @@
       </p:grpSpPr>
       <p:sp>
         <p:nvSpPr>
-          <p:cNvPr id="107" name="Google Shape;107;g226beb88262_0_107:notes"/>
+          <p:cNvPr id="106" name="Google Shape;106;g226beb88262_0_107:notes"/>
           <p:cNvSpPr/>
           <p:nvPr>
             <p:ph idx="2" type="sldImg"/>
@@ -1388,7 +1425,7 @@
       </p:sp>
       <p:sp>
         <p:nvSpPr>
-          <p:cNvPr id="108" name="Google Shape;108;g226beb88262_0_107:notes"/>
+          <p:cNvPr id="107" name="Google Shape;107;g226beb88262_0_107:notes"/>
           <p:cNvSpPr txBox="1"/>
           <p:nvPr>
             <p:ph idx="1" type="body"/>
@@ -1439,7 +1476,7 @@
   <p:cSld>
     <p:spTree>
       <p:nvGrpSpPr>
-        <p:cNvPr id="113" name="Shape 113"/>
+        <p:cNvPr id="112" name="Shape 112"/>
         <p:cNvGrpSpPr/>
         <p:nvPr/>
       </p:nvGrpSpPr>
@@ -1453,7 +1490,7 @@
       </p:grpSpPr>
       <p:sp>
         <p:nvSpPr>
-          <p:cNvPr id="114" name="Google Shape;114;g226beb88262_0_119:notes"/>
+          <p:cNvPr id="113" name="Google Shape;113;g226beb88262_0_119:notes"/>
           <p:cNvSpPr/>
           <p:nvPr>
             <p:ph idx="2" type="sldImg"/>
@@ -1488,7 +1525,7 @@
       </p:sp>
       <p:sp>
         <p:nvSpPr>
-          <p:cNvPr id="115" name="Google Shape;115;g226beb88262_0_119:notes"/>
+          <p:cNvPr id="114" name="Google Shape;114;g226beb88262_0_119:notes"/>
           <p:cNvSpPr txBox="1"/>
           <p:nvPr>
             <p:ph idx="1" type="body"/>
@@ -1521,6 +1558,106 @@
             <a:r>
               <a:rPr lang="en"/>
               <a:t>Talk about the initial vision we had for the project.</a:t>
+            </a:r>
+            <a:endParaRPr/>
+          </a:p>
+        </p:txBody>
+      </p:sp>
+    </p:spTree>
+  </p:cSld>
+  <p:clrMapOvr>
+    <a:masterClrMapping/>
+  </p:clrMapOvr>
+</p:notes>
+</file>
+
+<file path=ppt/notesSlides/notesSlide9.xml><?xml version="1.0" encoding="utf-8"?>
+<p:notes xmlns:a="http://schemas.openxmlformats.org/drawingml/2006/main" xmlns:r="http://schemas.openxmlformats.org/officeDocument/2006/relationships" xmlns:mc="http://schemas.openxmlformats.org/markup-compatibility/2006" xmlns:mv="urn:schemas-microsoft-com:mac:vml" xmlns:p="http://schemas.openxmlformats.org/presentationml/2006/main" xmlns:c="http://schemas.openxmlformats.org/drawingml/2006/chart" xmlns:dgm="http://schemas.openxmlformats.org/drawingml/2006/diagram" xmlns:o="urn:schemas-microsoft-com:office:office" xmlns:v="urn:schemas-microsoft-com:vml" xmlns:pvml="urn:schemas-microsoft-com:office:powerpoint" xmlns:com="http://schemas.openxmlformats.org/drawingml/2006/compatibility" xmlns:p14="http://schemas.microsoft.com/office/powerpoint/2010/main" xmlns:p15="http://schemas.microsoft.com/office/powerpoint/2012/main" xmlns:ahyp="http://schemas.microsoft.com/office/drawing/2018/hyperlinkcolor" showMasterPhAnim="0" showMasterSp="0">
+  <p:cSld>
+    <p:spTree>
+      <p:nvGrpSpPr>
+        <p:cNvPr id="117" name="Shape 117"/>
+        <p:cNvGrpSpPr/>
+        <p:nvPr/>
+      </p:nvGrpSpPr>
+      <p:grpSpPr>
+        <a:xfrm>
+          <a:off x="0" y="0"/>
+          <a:ext cx="0" cy="0"/>
+          <a:chOff x="0" y="0"/>
+          <a:chExt cx="0" cy="0"/>
+        </a:xfrm>
+      </p:grpSpPr>
+      <p:sp>
+        <p:nvSpPr>
+          <p:cNvPr id="118" name="Google Shape;118;g226beb88262_4_0:notes"/>
+          <p:cNvSpPr/>
+          <p:nvPr>
+            <p:ph idx="2" type="sldImg"/>
+          </p:nvPr>
+        </p:nvSpPr>
+        <p:spPr>
+          <a:xfrm>
+            <a:off x="381300" y="685800"/>
+            <a:ext cx="6096000" cy="3429000"/>
+          </a:xfrm>
+          <a:custGeom>
+            <a:rect b="b" l="l" r="r" t="t"/>
+            <a:pathLst>
+              <a:path extrusionOk="0" h="120000" w="120000">
+                <a:moveTo>
+                  <a:pt x="0" y="0"/>
+                </a:moveTo>
+                <a:lnTo>
+                  <a:pt x="120000" y="0"/>
+                </a:lnTo>
+                <a:lnTo>
+                  <a:pt x="120000" y="120000"/>
+                </a:lnTo>
+                <a:lnTo>
+                  <a:pt x="0" y="120000"/>
+                </a:lnTo>
+                <a:close/>
+              </a:path>
+            </a:pathLst>
+          </a:custGeom>
+        </p:spPr>
+      </p:sp>
+      <p:sp>
+        <p:nvSpPr>
+          <p:cNvPr id="119" name="Google Shape;119;g226beb88262_4_0:notes"/>
+          <p:cNvSpPr txBox="1"/>
+          <p:nvPr>
+            <p:ph idx="1" type="body"/>
+          </p:nvPr>
+        </p:nvSpPr>
+        <p:spPr>
+          <a:xfrm>
+            <a:off x="685800" y="4343400"/>
+            <a:ext cx="5486400" cy="4114800"/>
+          </a:xfrm>
+          <a:prstGeom prst="rect">
+            <a:avLst/>
+          </a:prstGeom>
+        </p:spPr>
+        <p:txBody>
+          <a:bodyPr anchorCtr="0" anchor="t" bIns="91425" lIns="91425" spcFirstLastPara="1" rIns="91425" wrap="square" tIns="91425">
+            <a:noAutofit/>
+          </a:bodyPr>
+          <a:lstStyle/>
+          <a:p>
+            <a:pPr indent="0" lvl="0" marL="0" rtl="0" algn="l">
+              <a:spcBef>
+                <a:spcPts val="0"/>
+              </a:spcBef>
+              <a:spcAft>
+                <a:spcPts val="0"/>
+              </a:spcAft>
+              <a:buNone/>
+            </a:pPr>
+            <a:r>
+              <a:rPr lang="en"/>
+              <a:t>Close and ask for questions.</a:t>
             </a:r>
             <a:endParaRPr/>
           </a:p>
@@ -8492,15 +8629,15 @@
         </p:nvSpPr>
         <p:spPr>
           <a:xfrm>
-            <a:off x="471900" y="738725"/>
-            <a:ext cx="4100100" cy="767700"/>
+            <a:off x="98250" y="16350"/>
+            <a:ext cx="8826600" cy="602700"/>
           </a:xfrm>
           <a:prstGeom prst="rect">
             <a:avLst/>
           </a:prstGeom>
         </p:spPr>
         <p:txBody>
-          <a:bodyPr anchorCtr="0" anchor="b" bIns="91425" lIns="91425" spcFirstLastPara="1" rIns="91425" wrap="square" tIns="91425">
+          <a:bodyPr anchorCtr="0" anchor="ctr" bIns="91425" lIns="91425" spcFirstLastPara="1" rIns="91425" wrap="square" tIns="91425">
             <a:normAutofit fontScale="90000"/>
           </a:bodyPr>
           <a:lstStyle/>
@@ -8543,13 +8680,13 @@
           <p:cNvPr id="98" name="Google Shape;98;p17"/>
           <p:cNvSpPr txBox="1"/>
           <p:nvPr>
-            <p:ph idx="1" type="body"/>
+            <p:ph idx="4294967295" type="body"/>
           </p:nvPr>
         </p:nvSpPr>
         <p:spPr>
           <a:xfrm>
-            <a:off x="471900" y="1919075"/>
-            <a:ext cx="4100100" cy="2710200"/>
+            <a:off x="46450" y="878000"/>
+            <a:ext cx="2345700" cy="4023600"/>
           </a:xfrm>
           <a:prstGeom prst="rect">
             <a:avLst/>
@@ -8578,58 +8715,9 @@
           </a:p>
         </p:txBody>
       </p:sp>
-      <p:sp>
-        <p:nvSpPr>
-          <p:cNvPr id="99" name="Google Shape;99;p17"/>
-          <p:cNvSpPr/>
-          <p:nvPr/>
-        </p:nvSpPr>
-        <p:spPr>
-          <a:xfrm>
-            <a:off x="5025575" y="-50"/>
-            <a:ext cx="4118400" cy="5143500"/>
-          </a:xfrm>
-          <a:prstGeom prst="rect">
-            <a:avLst/>
-          </a:prstGeom>
-          <a:solidFill>
-            <a:schemeClr val="lt1"/>
-          </a:solidFill>
-          <a:ln cap="flat" cmpd="sng" w="9525">
-            <a:solidFill>
-              <a:schemeClr val="lt1"/>
-            </a:solidFill>
-            <a:prstDash val="solid"/>
-            <a:round/>
-            <a:headEnd len="sm" w="sm" type="none"/>
-            <a:tailEnd len="sm" w="sm" type="none"/>
-          </a:ln>
-        </p:spPr>
-        <p:txBody>
-          <a:bodyPr anchorCtr="0" anchor="ctr" bIns="91425" lIns="91425" spcFirstLastPara="1" rIns="91425" wrap="square" tIns="91425">
-            <a:noAutofit/>
-          </a:bodyPr>
-          <a:lstStyle/>
-          <a:p>
-            <a:pPr indent="0" lvl="0" marL="0" rtl="0" algn="l">
-              <a:spcBef>
-                <a:spcPts val="0"/>
-              </a:spcBef>
-              <a:spcAft>
-                <a:spcPts val="0"/>
-              </a:spcAft>
-              <a:buNone/>
-            </a:pPr>
-            <a:r>
-              <a:t/>
-            </a:r>
-            <a:endParaRPr/>
-          </a:p>
-        </p:txBody>
-      </p:sp>
       <p:pic>
         <p:nvPicPr>
-          <p:cNvPr id="100" name="Google Shape;100;p17"/>
+          <p:cNvPr id="99" name="Google Shape;99;p17"/>
           <p:cNvPicPr preferRelativeResize="0"/>
           <p:nvPr/>
         </p:nvPicPr>
@@ -8643,21 +8731,15 @@
         </p:blipFill>
         <p:spPr>
           <a:xfrm>
-            <a:off x="5199375" y="63500"/>
-            <a:ext cx="3770800" cy="5016501"/>
+            <a:off x="2488775" y="878000"/>
+            <a:ext cx="6498627" cy="4023551"/>
           </a:xfrm>
           <a:prstGeom prst="rect">
             <a:avLst/>
           </a:prstGeom>
           <a:noFill/>
-          <a:ln cap="flat" cmpd="sng" w="9525">
-            <a:solidFill>
-              <a:schemeClr val="lt1"/>
-            </a:solidFill>
-            <a:prstDash val="solid"/>
-            <a:round/>
-            <a:headEnd len="sm" w="sm" type="none"/>
-            <a:tailEnd len="sm" w="sm" type="none"/>
+          <a:ln>
+            <a:noFill/>
           </a:ln>
         </p:spPr>
       </p:pic>
@@ -8674,7 +8756,7 @@
   <p:cSld>
     <p:spTree>
       <p:nvGrpSpPr>
-        <p:cNvPr id="104" name="Shape 104"/>
+        <p:cNvPr id="103" name="Shape 103"/>
         <p:cNvGrpSpPr/>
         <p:nvPr/>
       </p:nvGrpSpPr>
@@ -8688,7 +8770,7 @@
       </p:grpSpPr>
       <p:sp>
         <p:nvSpPr>
-          <p:cNvPr id="105" name="Google Shape;105;p18"/>
+          <p:cNvPr id="104" name="Google Shape;104;p18"/>
           <p:cNvSpPr txBox="1"/>
           <p:nvPr>
             <p:ph type="title"/>
@@ -8739,7 +8821,7 @@
   <p:cSld>
     <p:spTree>
       <p:nvGrpSpPr>
-        <p:cNvPr id="109" name="Shape 109"/>
+        <p:cNvPr id="108" name="Shape 108"/>
         <p:cNvGrpSpPr/>
         <p:nvPr/>
       </p:nvGrpSpPr>
@@ -8753,7 +8835,7 @@
       </p:grpSpPr>
       <p:sp>
         <p:nvSpPr>
-          <p:cNvPr id="110" name="Google Shape;110;p19"/>
+          <p:cNvPr id="109" name="Google Shape;109;p19"/>
           <p:cNvSpPr txBox="1"/>
           <p:nvPr>
             <p:ph type="title"/>
@@ -8793,7 +8875,7 @@
       </p:sp>
       <p:sp>
         <p:nvSpPr>
-          <p:cNvPr id="111" name="Google Shape;111;p19"/>
+          <p:cNvPr id="110" name="Google Shape;110;p19"/>
           <p:cNvSpPr txBox="1"/>
           <p:nvPr>
             <p:ph idx="1" type="body"/>
@@ -8860,7 +8942,7 @@
             </a:pPr>
             <a:r>
               <a:rPr lang="en"/>
-              <a:t>Post/Picture/Comment Upload</a:t>
+              <a:t>Posting pictures and comments</a:t>
             </a:r>
             <a:endParaRPr/>
           </a:p>
@@ -8877,7 +8959,7 @@
             </a:pPr>
             <a:r>
               <a:rPr lang="en"/>
-              <a:t>Comments</a:t>
+              <a:t>Viewing comments</a:t>
             </a:r>
             <a:endParaRPr/>
           </a:p>
@@ -8953,7 +9035,7 @@
       </p:sp>
       <p:sp>
         <p:nvSpPr>
-          <p:cNvPr id="112" name="Google Shape;112;p19"/>
+          <p:cNvPr id="111" name="Google Shape;111;p19"/>
           <p:cNvSpPr txBox="1"/>
           <p:nvPr>
             <p:ph idx="1" type="body"/>
@@ -9037,7 +9119,7 @@
             </a:pPr>
             <a:r>
               <a:rPr lang="en"/>
-              <a:t>Like Posts</a:t>
+              <a:t>Ability to like posts</a:t>
             </a:r>
             <a:endParaRPr/>
           </a:p>
@@ -9056,7 +9138,7 @@
   <p:cSld>
     <p:spTree>
       <p:nvGrpSpPr>
-        <p:cNvPr id="116" name="Shape 116"/>
+        <p:cNvPr id="115" name="Shape 115"/>
         <p:cNvGrpSpPr/>
         <p:nvPr/>
       </p:nvGrpSpPr>
@@ -9070,7 +9152,7 @@
       </p:grpSpPr>
       <p:pic>
         <p:nvPicPr>
-          <p:cNvPr id="117" name="Google Shape;117;p20"/>
+          <p:cNvPr id="116" name="Google Shape;116;p20"/>
           <p:cNvPicPr preferRelativeResize="0"/>
           <p:nvPr/>
         </p:nvPicPr>
@@ -9096,6 +9178,107 @@
           </a:ln>
         </p:spPr>
       </p:pic>
+    </p:spTree>
+  </p:cSld>
+  <p:clrMapOvr>
+    <a:masterClrMapping/>
+  </p:clrMapOvr>
+</p:sld>
+</file>
+
+<file path=ppt/slides/slide9.xml><?xml version="1.0" encoding="utf-8"?>
+<p:sld xmlns:a="http://schemas.openxmlformats.org/drawingml/2006/main" xmlns:r="http://schemas.openxmlformats.org/officeDocument/2006/relationships" xmlns:mc="http://schemas.openxmlformats.org/markup-compatibility/2006" xmlns:mv="urn:schemas-microsoft-com:mac:vml" xmlns:p="http://schemas.openxmlformats.org/presentationml/2006/main" xmlns:c="http://schemas.openxmlformats.org/drawingml/2006/chart" xmlns:dgm="http://schemas.openxmlformats.org/drawingml/2006/diagram" xmlns:o="urn:schemas-microsoft-com:office:office" xmlns:v="urn:schemas-microsoft-com:vml" xmlns:pvml="urn:schemas-microsoft-com:office:powerpoint" xmlns:com="http://schemas.openxmlformats.org/drawingml/2006/compatibility" xmlns:p14="http://schemas.microsoft.com/office/powerpoint/2010/main" xmlns:p15="http://schemas.microsoft.com/office/powerpoint/2012/main" xmlns:ahyp="http://schemas.microsoft.com/office/drawing/2018/hyperlinkcolor">
+  <p:cSld>
+    <p:spTree>
+      <p:nvGrpSpPr>
+        <p:cNvPr id="120" name="Shape 120"/>
+        <p:cNvGrpSpPr/>
+        <p:nvPr/>
+      </p:nvGrpSpPr>
+      <p:grpSpPr>
+        <a:xfrm>
+          <a:off x="0" y="0"/>
+          <a:ext cx="0" cy="0"/>
+          <a:chOff x="0" y="0"/>
+          <a:chExt cx="0" cy="0"/>
+        </a:xfrm>
+      </p:grpSpPr>
+      <p:sp>
+        <p:nvSpPr>
+          <p:cNvPr id="121" name="Google Shape;121;p21"/>
+          <p:cNvSpPr txBox="1"/>
+          <p:nvPr>
+            <p:ph type="title"/>
+          </p:nvPr>
+        </p:nvSpPr>
+        <p:spPr>
+          <a:xfrm>
+            <a:off x="460950" y="2065350"/>
+            <a:ext cx="8222100" cy="1012800"/>
+          </a:xfrm>
+          <a:prstGeom prst="rect">
+            <a:avLst/>
+          </a:prstGeom>
+        </p:spPr>
+        <p:txBody>
+          <a:bodyPr anchorCtr="0" anchor="ctr" bIns="91425" lIns="91425" spcFirstLastPara="1" rIns="91425" wrap="square" tIns="91425">
+            <a:noAutofit/>
+          </a:bodyPr>
+          <a:lstStyle/>
+          <a:p>
+            <a:pPr indent="0" lvl="0" marL="0" rtl="0" algn="ctr">
+              <a:spcBef>
+                <a:spcPts val="0"/>
+              </a:spcBef>
+              <a:spcAft>
+                <a:spcPts val="0"/>
+              </a:spcAft>
+              <a:buNone/>
+            </a:pPr>
+            <a:r>
+              <a:rPr lang="en" sz="6200">
+                <a:latin typeface="Lexend"/>
+                <a:ea typeface="Lexend"/>
+                <a:cs typeface="Lexend"/>
+                <a:sym typeface="Lexend"/>
+              </a:rPr>
+              <a:t>Thank you!</a:t>
+            </a:r>
+            <a:endParaRPr sz="6200">
+              <a:latin typeface="Lexend"/>
+              <a:ea typeface="Lexend"/>
+              <a:cs typeface="Lexend"/>
+              <a:sym typeface="Lexend"/>
+            </a:endParaRPr>
+          </a:p>
+          <a:p>
+            <a:pPr indent="0" lvl="0" marL="0" rtl="0" algn="ctr">
+              <a:spcBef>
+                <a:spcPts val="0"/>
+              </a:spcBef>
+              <a:spcAft>
+                <a:spcPts val="0"/>
+              </a:spcAft>
+              <a:buNone/>
+            </a:pPr>
+            <a:r>
+              <a:rPr lang="en" sz="4000">
+                <a:latin typeface="Lexend"/>
+                <a:ea typeface="Lexend"/>
+                <a:cs typeface="Lexend"/>
+                <a:sym typeface="Lexend"/>
+              </a:rPr>
+              <a:t>Questions?</a:t>
+            </a:r>
+            <a:endParaRPr sz="4000">
+              <a:latin typeface="Lexend"/>
+              <a:ea typeface="Lexend"/>
+              <a:cs typeface="Lexend"/>
+              <a:sym typeface="Lexend"/>
+            </a:endParaRPr>
+          </a:p>
+        </p:txBody>
+      </p:sp>
     </p:spTree>
   </p:cSld>
   <p:clrMapOvr>

</xml_diff>